<commit_message>
Add new layouts and features to presentation generator
</commit_message>
<xml_diff>
--- a/out4.pptx
+++ b/out4.pptx
@@ -13,10 +13,8 @@
     <p:sldId id="261" r:id="rId11"/>
     <p:sldId id="262" r:id="rId12"/>
     <p:sldId id="263" r:id="rId13"/>
-    <p:sldId id="264" r:id="rId14"/>
-    <p:sldId id="265" r:id="rId15"/>
   </p:sldIdLst>
-  <p:sldSz cx="9144000" cy="6858000"/>
+  <p:sldSz cx="12192000" cy="6858000"/>
   <p:notesSz cx="6858000" cy="9144000"/>
   <p:defaultTextStyle>
     <a:defPPr>
@@ -5806,86 +5804,6 @@
 </file>
 
 <file path=ppt/slides/slide1.xml><?xml version="1.0" encoding="utf-8"?>
-<p:sld xmlns:a="http://schemas.openxmlformats.org/drawingml/2006/main" xmlns:r="http://schemas.openxmlformats.org/officeDocument/2006/relationships" xmlns:p="http://schemas.openxmlformats.org/presentationml/2006/main">
-  <p:cSld>
-    <p:spTree>
-      <p:nvGrpSpPr>
-        <p:cNvPr id="1" name=""/>
-        <p:cNvGrpSpPr/>
-        <p:nvPr/>
-      </p:nvGrpSpPr>
-      <p:grpSpPr>
-        <a:xfrm>
-          <a:off x="0" y="0"/>
-          <a:ext cx="0" cy="0"/>
-          <a:chOff x="0" y="0"/>
-          <a:chExt cx="0" cy="0"/>
-        </a:xfrm>
-      </p:grpSpPr>
-      <p:sp>
-        <p:nvSpPr>
-          <p:cNvPr id="2" name="Title 1">
-            <a:extLst>
-              <a:ext uri="{FF2B5EF4-FFF2-40B4-BE49-F238E27FC236}">
-                <a16:creationId xmlns:a16="http://schemas.microsoft.com/office/drawing/2014/main" id="{AC10EDF4-686F-F8EB-286F-3FC8FB789068}"/>
-              </a:ext>
-            </a:extLst>
-          </p:cNvPr>
-          <p:cNvSpPr>
-            <a:spLocks noGrp="1"/>
-          </p:cNvSpPr>
-          <p:nvPr>
-            <p:ph type="ctrTitle"/>
-          </p:nvPr>
-        </p:nvSpPr>
-        <p:spPr/>
-        <p:txBody>
-          <a:bodyPr/>
-          <a:lstStyle/>
-          <a:p>
-            <a:endParaRPr lang="en-US"/>
-          </a:p>
-        </p:txBody>
-      </p:sp>
-      <p:sp>
-        <p:nvSpPr>
-          <p:cNvPr id="3" name="Subtitle 2">
-            <a:extLst>
-              <a:ext uri="{FF2B5EF4-FFF2-40B4-BE49-F238E27FC236}">
-                <a16:creationId xmlns:a16="http://schemas.microsoft.com/office/drawing/2014/main" id="{D29FF052-96FD-5FE1-B187-2C0A35ACF5CA}"/>
-              </a:ext>
-            </a:extLst>
-          </p:cNvPr>
-          <p:cNvSpPr>
-            <a:spLocks noGrp="1"/>
-          </p:cNvSpPr>
-          <p:nvPr>
-            <p:ph type="subTitle" idx="1"/>
-          </p:nvPr>
-        </p:nvSpPr>
-        <p:spPr/>
-        <p:txBody>
-          <a:bodyPr/>
-          <a:lstStyle/>
-          <a:p>
-            <a:endParaRPr lang="en-US"/>
-          </a:p>
-        </p:txBody>
-      </p:sp>
-    </p:spTree>
-    <p:extLst>
-      <p:ext uri="{BB962C8B-B14F-4D97-AF65-F5344CB8AC3E}">
-        <p14:creationId xmlns:p14="http://schemas.microsoft.com/office/powerpoint/2010/main" val="1947262446"/>
-      </p:ext>
-    </p:extLst>
-  </p:cSld>
-  <p:clrMapOvr>
-    <a:masterClrMapping/>
-  </p:clrMapOvr>
-</p:sld>
-</file>
-
-<file path=ppt/slides/slide10.xml><?xml version="1.0" encoding="utf-8"?>
 <p:sld xmlns:a="http://schemas.openxmlformats.org/drawingml/2006/main" xmlns:p="http://schemas.openxmlformats.org/presentationml/2006/main" xmlns:r="http://schemas.openxmlformats.org/officeDocument/2006/relationships">
   <p:cSld>
     <p:spTree>
@@ -5902,7 +5820,7 @@
             <a:spLocks noGrp="1"/>
           </p:cNvSpPr>
           <p:nvPr>
-            <p:ph type="title"/>
+            <p:ph type="ctrTitle"/>
           </p:nvPr>
         </p:nvSpPr>
         <p:spPr/>
@@ -5911,31 +5829,28 @@
           <a:lstStyle/>
           <a:p>
             <a:r>
-              <a:t>Conclusion</a:t>
-            </a:r>
-          </a:p>
-        </p:txBody>
-      </p:sp>
-      <p:sp>
-        <p:nvSpPr>
-          <p:cNvPr id="3" name="Content Placeholder 2"/>
-          <p:cNvSpPr>
-            <a:spLocks noGrp="1"/>
-          </p:cNvSpPr>
-          <p:nvPr>
-            <p:ph idx="1"/>
+              <a:t>History of France in Football</a:t>
+            </a:r>
+          </a:p>
+        </p:txBody>
+      </p:sp>
+      <p:sp>
+        <p:nvSpPr>
+          <p:cNvPr id="3" name="Subtitle 2"/>
+          <p:cNvSpPr>
+            <a:spLocks noGrp="1"/>
+          </p:cNvSpPr>
+          <p:nvPr>
+            <p:ph type="subTitle" idx="1"/>
           </p:nvPr>
         </p:nvSpPr>
         <p:spPr/>
         <p:txBody>
-          <a:bodyPr wrap="square">
-            <a:normAutofit/>
-          </a:bodyPr>
-          <a:lstStyle/>
-          <a:p>
-            <a:pPr/>
-            <a:r>
-              <a:t>France's rich history in football is a testament to the country's passion and dedication to the sport. From its early years to the present day, French football has evolved significantly, with a plethora of talented players, successful teams, and iconic moments contributing to the nation's football heritage. This presentation has highlighted key milestones, notable players, and significant achievements that have shaped the nation's football identity.</a:t>
+          <a:bodyPr/>
+          <a:lstStyle/>
+          <a:p>
+            <a:r>
+              <a:t>Created with AI Presentation Generator</a:t>
             </a:r>
           </a:p>
         </p:txBody>
@@ -5965,7 +5880,7 @@
             <a:spLocks noGrp="1"/>
           </p:cNvSpPr>
           <p:nvPr>
-            <p:ph type="ctrTitle"/>
+            <p:ph type="title"/>
           </p:nvPr>
         </p:nvSpPr>
         <p:spPr/>
@@ -5974,28 +5889,31 @@
           <a:lstStyle/>
           <a:p>
             <a:r>
-              <a:t>The History of France in Football</a:t>
-            </a:r>
-          </a:p>
-        </p:txBody>
-      </p:sp>
-      <p:sp>
-        <p:nvSpPr>
-          <p:cNvPr id="3" name="Subtitle 2"/>
-          <p:cNvSpPr>
-            <a:spLocks noGrp="1"/>
-          </p:cNvSpPr>
-          <p:nvPr>
-            <p:ph type="subTitle" idx="1"/>
+              <a:t>Introduction</a:t>
+            </a:r>
+          </a:p>
+        </p:txBody>
+      </p:sp>
+      <p:sp>
+        <p:nvSpPr>
+          <p:cNvPr id="3" name="Content Placeholder 2"/>
+          <p:cNvSpPr>
+            <a:spLocks noGrp="1"/>
+          </p:cNvSpPr>
+          <p:nvPr>
+            <p:ph idx="1"/>
           </p:nvPr>
         </p:nvSpPr>
         <p:spPr/>
         <p:txBody>
-          <a:bodyPr/>
-          <a:lstStyle/>
-          <a:p>
-            <a:r>
-              <a:t>Created with AI Presentation Generator</a:t>
+          <a:bodyPr wrap="square">
+            <a:normAutofit/>
+          </a:bodyPr>
+          <a:lstStyle/>
+          <a:p>
+            <a:pPr/>
+            <a:r>
+              <a:t>France has a rich history in football, with a legacy spanning over a century. The country has produced some of the greatest footballers and teams in the world, with a unique blend of technical skill, tactical innovation, and passionate fan culture. This presentation will delve into the fascinating story of France's rise to football supremacy, exploring key milestones, legendary players, and iconic moments that have shaped the nation's love affair with the beautiful game.</a:t>
             </a:r>
           </a:p>
         </p:txBody>
@@ -6020,69 +5938,6 @@
       <p:grpSpPr/>
       <p:sp>
         <p:nvSpPr>
-          <p:cNvPr id="2" name="Title 1"/>
-          <p:cNvSpPr>
-            <a:spLocks noGrp="1"/>
-          </p:cNvSpPr>
-          <p:nvPr>
-            <p:ph type="title"/>
-          </p:nvPr>
-        </p:nvSpPr>
-        <p:spPr/>
-        <p:txBody>
-          <a:bodyPr/>
-          <a:lstStyle/>
-          <a:p>
-            <a:r>
-              <a:t>Introduction</a:t>
-            </a:r>
-          </a:p>
-        </p:txBody>
-      </p:sp>
-      <p:sp>
-        <p:nvSpPr>
-          <p:cNvPr id="3" name="Content Placeholder 2"/>
-          <p:cNvSpPr>
-            <a:spLocks noGrp="1"/>
-          </p:cNvSpPr>
-          <p:nvPr>
-            <p:ph idx="1"/>
-          </p:nvPr>
-        </p:nvSpPr>
-        <p:spPr/>
-        <p:txBody>
-          <a:bodyPr wrap="square">
-            <a:normAutofit/>
-          </a:bodyPr>
-          <a:lstStyle/>
-          <a:p>
-            <a:pPr/>
-            <a:r>
-              <a:t>France has a rich history in football, spanning over a century, with a plethora of talented players, successful teams, and iconic moments that have contributed significantly to the country's football heritage. The French football federation was established in 1919, and since then, the country has emerged as a major force in international football competitions. This presentation aims to explore the evolution of football in France, highlighting key milestones, notable players, and significant achievements that have shaped the nation's football identity.</a:t>
-            </a:r>
-          </a:p>
-        </p:txBody>
-      </p:sp>
-    </p:spTree>
-  </p:cSld>
-  <p:clrMapOvr>
-    <a:masterClrMapping/>
-  </p:clrMapOvr>
-</p:sld>
-</file>
-
-<file path=ppt/slides/slide4.xml><?xml version="1.0" encoding="utf-8"?>
-<p:sld xmlns:a="http://schemas.openxmlformats.org/drawingml/2006/main" xmlns:p="http://schemas.openxmlformats.org/presentationml/2006/main" xmlns:r="http://schemas.openxmlformats.org/officeDocument/2006/relationships">
-  <p:cSld>
-    <p:spTree>
-      <p:nvGrpSpPr>
-        <p:cNvPr id="1" name=""/>
-        <p:cNvGrpSpPr/>
-        <p:nvPr/>
-      </p:nvGrpSpPr>
-      <p:grpSpPr/>
-      <p:sp>
-        <p:nvSpPr>
           <p:cNvPr id="2" name="TextBox 1"/>
           <p:cNvSpPr txBox="1"/>
           <p:nvPr/>
@@ -6138,7 +5993,7 @@
               <a:defRPr sz="1400"/>
             </a:pPr>
             <a:r>
-              <a:t>The first French international football match was played in 1904, marking the beginning of the country's involvement in international competitions.</a:t>
+              <a:t>France's early football history was marked by inconsistent performances, with the national team failing to qualify for several major tournaments. However, this period saw the emergence of pioneering figures such as Raoul Diagne, a Senegalese-born French footballer who broke racial barriers in the sport. Diagne's trailblazing career paved the way for future generations of French players.</a:t>
             </a:r>
           </a:p>
           <a:p>
@@ -6146,7 +6001,7 @@
               <a:defRPr sz="1400"/>
             </a:pPr>
             <a:r>
-              <a:t>France's early years in football were marked by modest success, with the team competing in the inaugural FIFA World Cup in 1930.</a:t>
+              <a:t>The late 1920s and early 1930s witnessed a significant improvement in France's football fortunes, with the national team reaching the quarter-finals of the 1930 World Cup in Uruguay. This unexpected run to the last eight was a testament to the team's growing maturity and tactical acumen under the guidance of coach Raoul Caudron.</a:t>
             </a:r>
           </a:p>
           <a:p>
@@ -6154,14 +6009,14 @@
               <a:defRPr sz="1400"/>
             </a:pPr>
             <a:r>
-              <a:t>The French football federation was initially formed in 1919, with the aim of promoting football development and international participation.</a:t>
+              <a:t>France's domestic football scene was also gaining momentum during this era, with the establishment of the French Football Federation in 1919 and the creation of the French league in 1932. These developments laid the groundwork for the country's football infrastructure and paved the way for future successes.</a:t>
             </a:r>
           </a:p>
         </p:txBody>
       </p:sp>
       <p:pic>
         <p:nvPicPr>
-          <p:cNvPr id="4" name="Picture 3" descr="Early Years (1900s-1940s)_1-29wyvvLJA.jpg"/>
+          <p:cNvPr id="4" name="Picture 3" descr="Early Years (1900s-1940s)_lYzap0eubDY.jpg"/>
           <p:cNvPicPr>
             <a:picLocks noChangeAspect="1"/>
           </p:cNvPicPr>
@@ -6191,6 +6046,81 @@
 </p:sld>
 </file>
 
+<file path=ppt/slides/slide4.xml><?xml version="1.0" encoding="utf-8"?>
+<p:sld xmlns:a="http://schemas.openxmlformats.org/drawingml/2006/main" xmlns:p="http://schemas.openxmlformats.org/presentationml/2006/main" xmlns:r="http://schemas.openxmlformats.org/officeDocument/2006/relationships">
+  <p:cSld>
+    <p:spTree>
+      <p:nvGrpSpPr>
+        <p:cNvPr id="1" name=""/>
+        <p:cNvGrpSpPr/>
+        <p:nvPr/>
+      </p:nvGrpSpPr>
+      <p:grpSpPr/>
+      <p:sp>
+        <p:nvSpPr>
+          <p:cNvPr id="2" name="Title 1"/>
+          <p:cNvSpPr>
+            <a:spLocks noGrp="1"/>
+          </p:cNvSpPr>
+          <p:nvPr>
+            <p:ph type="title"/>
+          </p:nvPr>
+        </p:nvSpPr>
+        <p:spPr/>
+        <p:txBody>
+          <a:bodyPr/>
+          <a:lstStyle/>
+          <a:p>
+            <a:r>
+              <a:t>The Golden Years (1950s-1970s)</a:t>
+            </a:r>
+          </a:p>
+        </p:txBody>
+      </p:sp>
+      <p:sp>
+        <p:nvSpPr>
+          <p:cNvPr id="3" name="Content Placeholder 2"/>
+          <p:cNvSpPr>
+            <a:spLocks noGrp="1"/>
+          </p:cNvSpPr>
+          <p:nvPr>
+            <p:ph idx="1"/>
+          </p:nvPr>
+        </p:nvSpPr>
+        <p:spPr/>
+        <p:txBody>
+          <a:bodyPr wrap="square">
+            <a:normAutofit/>
+          </a:bodyPr>
+          <a:lstStyle/>
+          <a:p>
+            <a:pPr/>
+            <a:r>
+              <a:t>The 1950s and 1960s are often regarded as France's golden era in football, with the national team winning the 1958 World Cup in Sweden and reaching the final in 1960. This period was characterized by the dominance of legendary players such as Just Fontaine, who scored 13 goals in the 1958 World Cup, and Raymond Kopa, a skilled midfielder who captained the team to the 1960 European Championship title.</a:t>
+            </a:r>
+          </a:p>
+          <a:p>
+            <a:pPr/>
+            <a:r>
+              <a:t>France's success during this era was built on the back of a talented generation of players who were influenced by the country's unique football culture. The team's playing style, which emphasized flair and creativity, was shaped by the likes of coach Albert Batteux and his innovative tactics.</a:t>
+            </a:r>
+          </a:p>
+          <a:p>
+            <a:pPr/>
+            <a:r>
+              <a:t>The 1970s saw a slight decline in France's football fortunes, with the national team failing to qualify for several major tournaments. However, this period also witnessed the emergence of new talent, including the likes of Michel Platini, who would go on to become one of the greatest players in French history.</a:t>
+            </a:r>
+          </a:p>
+        </p:txBody>
+      </p:sp>
+    </p:spTree>
+  </p:cSld>
+  <p:clrMapOvr>
+    <a:masterClrMapping/>
+  </p:clrMapOvr>
+</p:sld>
+</file>
+
 <file path=ppt/slides/slide5.xml><?xml version="1.0" encoding="utf-8"?>
 <p:sld xmlns:a="http://schemas.openxmlformats.org/drawingml/2006/main" xmlns:p="http://schemas.openxmlformats.org/presentationml/2006/main" xmlns:r="http://schemas.openxmlformats.org/officeDocument/2006/relationships">
   <p:cSld>
@@ -6203,57 +6133,101 @@
       <p:grpSpPr/>
       <p:sp>
         <p:nvSpPr>
-          <p:cNvPr id="2" name="Title 1"/>
-          <p:cNvSpPr>
-            <a:spLocks noGrp="1"/>
-          </p:cNvSpPr>
-          <p:nvPr>
-            <p:ph type="title"/>
-          </p:nvPr>
-        </p:nvSpPr>
-        <p:spPr/>
-        <p:txBody>
-          <a:bodyPr/>
-          <a:lstStyle/>
-          <a:p>
-            <a:r>
-              <a:t>Post-War Era (1940s-1970s)</a:t>
-            </a:r>
-          </a:p>
-        </p:txBody>
-      </p:sp>
-      <p:sp>
-        <p:nvSpPr>
-          <p:cNvPr id="3" name="Content Placeholder 2"/>
-          <p:cNvSpPr>
-            <a:spLocks noGrp="1"/>
-          </p:cNvSpPr>
-          <p:nvPr>
-            <p:ph idx="1"/>
-          </p:nvPr>
-        </p:nvSpPr>
-        <p:spPr/>
+          <p:cNvPr id="2" name="TextBox 1"/>
+          <p:cNvSpPr txBox="1"/>
+          <p:nvPr/>
+        </p:nvSpPr>
+        <p:spPr>
+          <a:xfrm>
+            <a:off x="457200" y="457200"/>
+            <a:ext cx="8229600" cy="914400"/>
+          </a:xfrm>
+          <a:prstGeom prst="rect">
+            <a:avLst/>
+          </a:prstGeom>
+          <a:noFill/>
+        </p:spPr>
+        <p:txBody>
+          <a:bodyPr wrap="none">
+            <a:spAutoFit/>
+          </a:bodyPr>
+          <a:lstStyle/>
+          <a:p>
+            <a:pPr>
+              <a:defRPr sz="3200" b="1"/>
+            </a:pPr>
+            <a:r>
+              <a:t>Michel Platini and the Rise of French Football (1980s)</a:t>
+            </a:r>
+          </a:p>
+        </p:txBody>
+      </p:sp>
+      <p:sp>
+        <p:nvSpPr>
+          <p:cNvPr id="3" name="TextBox 2"/>
+          <p:cNvSpPr txBox="1"/>
+          <p:nvPr/>
+        </p:nvSpPr>
+        <p:spPr>
+          <a:xfrm>
+            <a:off x="457200" y="1371600"/>
+            <a:ext cx="4114800" cy="5029200"/>
+          </a:xfrm>
+          <a:prstGeom prst="rect">
+            <a:avLst/>
+          </a:prstGeom>
+          <a:noFill/>
+        </p:spPr>
         <p:txBody>
           <a:bodyPr wrap="square">
-            <a:normAutofit/>
+            <a:spAutoFit/>
           </a:bodyPr>
           <a:lstStyle/>
           <a:p>
-            <a:pPr/>
-            <a:r>
-              <a:t>The post-war era saw a significant resurgence in French football, with the team reaching the FIFA World Cup final in 1958.</a:t>
-            </a:r>
-          </a:p>
-          <a:p>
-            <a:pPr/>
-            <a:r>
-              <a:t>This period was characterized by the emergence of iconic players like Raymond Kopa and Just Fontaine, who played crucial roles in France's rise to prominence.</a:t>
-            </a:r>
-          </a:p>
-          <a:p>
-            <a:pPr/>
-            <a:r>
-              <a:t>The introduction of the European Cup in 1955 further solidified France's position in European football, with French clubs competing in the prestigious tournament.</a:t>
+            <a:pPr>
+              <a:defRPr sz="1400"/>
+            </a:pPr>
+            <a:r>
+              <a:t>The 1980s are often regarded as the dawn of a new era in French football, with Michel Platini leading the national team to unprecedented success. Under Platini's guidance, France won the 1984 European Championship and reached the final in 1988, where they were narrowly defeated by the Netherlands.</a:t>
+            </a:r>
+          </a:p>
+        </p:txBody>
+      </p:sp>
+      <p:sp>
+        <p:nvSpPr>
+          <p:cNvPr id="4" name="TextBox 3"/>
+          <p:cNvSpPr txBox="1"/>
+          <p:nvPr/>
+        </p:nvSpPr>
+        <p:spPr>
+          <a:xfrm>
+            <a:off x="5029200" y="1371600"/>
+            <a:ext cx="4114800" cy="5029200"/>
+          </a:xfrm>
+          <a:prstGeom prst="rect">
+            <a:avLst/>
+          </a:prstGeom>
+          <a:noFill/>
+        </p:spPr>
+        <p:txBody>
+          <a:bodyPr wrap="square">
+            <a:spAutoFit/>
+          </a:bodyPr>
+          <a:lstStyle/>
+          <a:p>
+            <a:pPr>
+              <a:defRPr sz="1400"/>
+            </a:pPr>
+            <a:r>
+              <a:t>Platini's career was marked by his exceptional skill, vision, and leadership, which inspired a generation of French players. He was the driving force behind France's attacking style, which emphasized speed, agility, and precision.</a:t>
+            </a:r>
+          </a:p>
+          <a:p>
+            <a:pPr>
+              <a:defRPr sz="1400"/>
+            </a:pPr>
+            <a:r>
+              <a:t>Platini's influence extended beyond his playing career, as he went on to become the first French player to captain the national team in a major tournament. He was also a pioneer in popularizing the 'tiki-taka' style of football, which emphasized possession and creative play.</a:t>
             </a:r>
           </a:p>
         </p:txBody>
@@ -6276,128 +6250,9 @@
         <p:nvPr/>
       </p:nvGrpSpPr>
       <p:grpSpPr/>
-      <p:sp>
-        <p:nvSpPr>
-          <p:cNvPr id="2" name="TextBox 1"/>
-          <p:cNvSpPr txBox="1"/>
-          <p:nvPr/>
-        </p:nvSpPr>
-        <p:spPr>
-          <a:xfrm>
-            <a:off x="457200" y="457200"/>
-            <a:ext cx="8229600" cy="914400"/>
-          </a:xfrm>
-          <a:prstGeom prst="rect">
-            <a:avLst/>
-          </a:prstGeom>
-          <a:noFill/>
-        </p:spPr>
-        <p:txBody>
-          <a:bodyPr wrap="none">
-            <a:spAutoFit/>
-          </a:bodyPr>
-          <a:lstStyle/>
-          <a:p>
-            <a:pPr>
-              <a:defRPr sz="3200" b="1"/>
-            </a:pPr>
-            <a:r>
-              <a:t>Golden Generation (1980s-1990s)</a:t>
-            </a:r>
-          </a:p>
-        </p:txBody>
-      </p:sp>
-      <p:sp>
-        <p:nvSpPr>
-          <p:cNvPr id="3" name="TextBox 2"/>
-          <p:cNvSpPr txBox="1"/>
-          <p:nvPr/>
-        </p:nvSpPr>
-        <p:spPr>
-          <a:xfrm>
-            <a:off x="457200" y="1371600"/>
-            <a:ext cx="4114800" cy="5029200"/>
-          </a:xfrm>
-          <a:prstGeom prst="rect">
-            <a:avLst/>
-          </a:prstGeom>
-          <a:noFill/>
-        </p:spPr>
-        <p:txBody>
-          <a:bodyPr wrap="square">
-            <a:spAutoFit/>
-          </a:bodyPr>
-          <a:lstStyle/>
-          <a:p>
-            <a:pPr>
-              <a:defRPr sz="1400"/>
-            </a:pPr>
-            <a:r>
-              <a:t>The 1980s and 1990s are often regarded as the golden era of French football, with the emergence of talented players like Michel Platini, Jean-Pierre Papin, and Zinedine Zidane.</a:t>
-            </a:r>
-          </a:p>
-        </p:txBody>
-      </p:sp>
-      <p:sp>
-        <p:nvSpPr>
-          <p:cNvPr id="4" name="TextBox 3"/>
-          <p:cNvSpPr txBox="1"/>
-          <p:nvPr/>
-        </p:nvSpPr>
-        <p:spPr>
-          <a:xfrm>
-            <a:off x="5029200" y="1371600"/>
-            <a:ext cx="4114800" cy="5029200"/>
-          </a:xfrm>
-          <a:prstGeom prst="rect">
-            <a:avLst/>
-          </a:prstGeom>
-          <a:noFill/>
-        </p:spPr>
-        <p:txBody>
-          <a:bodyPr wrap="square">
-            <a:spAutoFit/>
-          </a:bodyPr>
-          <a:lstStyle/>
-          <a:p>
-            <a:pPr>
-              <a:defRPr sz="1400"/>
-            </a:pPr>
-            <a:r>
-              <a:t>This period saw France reach the World Cup final in 1986 and 1998, with the team ultimately winning the tournament in 1998.</a:t>
-            </a:r>
-          </a:p>
-          <a:p>
-            <a:pPr>
-              <a:defRPr sz="1400"/>
-            </a:pPr>
-            <a:r>
-              <a:t>The French national team's success during this period was characterized by a distinctive playing style, which emphasized creativity, skill, and flair.</a:t>
-            </a:r>
-          </a:p>
-        </p:txBody>
-      </p:sp>
-    </p:spTree>
-  </p:cSld>
-  <p:clrMapOvr>
-    <a:masterClrMapping/>
-  </p:clrMapOvr>
-</p:sld>
-</file>
-
-<file path=ppt/slides/slide7.xml><?xml version="1.0" encoding="utf-8"?>
-<p:sld xmlns:a="http://schemas.openxmlformats.org/drawingml/2006/main" xmlns:p="http://schemas.openxmlformats.org/presentationml/2006/main" xmlns:r="http://schemas.openxmlformats.org/officeDocument/2006/relationships">
-  <p:cSld>
-    <p:spTree>
-      <p:nvGrpSpPr>
-        <p:cNvPr id="1" name=""/>
-        <p:cNvGrpSpPr/>
-        <p:nvPr/>
-      </p:nvGrpSpPr>
-      <p:grpSpPr/>
       <p:pic>
         <p:nvPicPr>
-          <p:cNvPr id="2" name="Picture 1" descr="Modern Era (2000s-Present)_lYzap0eubDY.jpg"/>
+          <p:cNvPr id="2" name="Picture 1" descr="Early Years (1900s-1940s)_lYzap0eubDY.jpg"/>
           <p:cNvPicPr>
             <a:picLocks noChangeAspect="1"/>
           </p:cNvPicPr>
@@ -6451,7 +6306,82 @@
               </a:defRPr>
             </a:pPr>
             <a:r>
-              <a:t>Modern Era (2000s-Present)</a:t>
+              <a:t>Zinedine Zidane and the Modern Era (1990s-2000s)</a:t>
+            </a:r>
+          </a:p>
+        </p:txBody>
+      </p:sp>
+    </p:spTree>
+  </p:cSld>
+  <p:clrMapOvr>
+    <a:masterClrMapping/>
+  </p:clrMapOvr>
+</p:sld>
+</file>
+
+<file path=ppt/slides/slide7.xml><?xml version="1.0" encoding="utf-8"?>
+<p:sld xmlns:a="http://schemas.openxmlformats.org/drawingml/2006/main" xmlns:p="http://schemas.openxmlformats.org/presentationml/2006/main" xmlns:r="http://schemas.openxmlformats.org/officeDocument/2006/relationships">
+  <p:cSld>
+    <p:spTree>
+      <p:nvGrpSpPr>
+        <p:cNvPr id="1" name=""/>
+        <p:cNvGrpSpPr/>
+        <p:nvPr/>
+      </p:nvGrpSpPr>
+      <p:grpSpPr/>
+      <p:sp>
+        <p:nvSpPr>
+          <p:cNvPr id="2" name="Title 1"/>
+          <p:cNvSpPr>
+            <a:spLocks noGrp="1"/>
+          </p:cNvSpPr>
+          <p:nvPr>
+            <p:ph type="title"/>
+          </p:nvPr>
+        </p:nvSpPr>
+        <p:spPr/>
+        <p:txBody>
+          <a:bodyPr/>
+          <a:lstStyle/>
+          <a:p>
+            <a:r>
+              <a:t>Modern France and the Road to Success (2010s-Present)</a:t>
+            </a:r>
+          </a:p>
+        </p:txBody>
+      </p:sp>
+      <p:sp>
+        <p:nvSpPr>
+          <p:cNvPr id="3" name="Content Placeholder 2"/>
+          <p:cNvSpPr>
+            <a:spLocks noGrp="1"/>
+          </p:cNvSpPr>
+          <p:nvPr>
+            <p:ph idx="1"/>
+          </p:nvPr>
+        </p:nvSpPr>
+        <p:spPr/>
+        <p:txBody>
+          <a:bodyPr wrap="square">
+            <a:normAutofit/>
+          </a:bodyPr>
+          <a:lstStyle/>
+          <a:p>
+            <a:pPr/>
+            <a:r>
+              <a:t>The 2010s saw a significant improvement in France's football fortunes, with the national team winning the 2018 World Cup in Russia. This victory was built on the back of a talented generation of players, including the likes of Kylian Mbappé, Paul Pogba, and N'Golo Kanté.</a:t>
+            </a:r>
+          </a:p>
+          <a:p>
+            <a:pPr/>
+            <a:r>
+              <a:t>France's success during this era was characterized by the dominance of a new generation of players who were influenced by the country's unique football culture. The team's playing style, which emphasized speed, agility, and precision, was shaped by the likes of coach Didier Deschamps and his innovative tactics.</a:t>
+            </a:r>
+          </a:p>
+          <a:p>
+            <a:pPr/>
+            <a:r>
+              <a:t>The 2020s have seen France continue to evolve as a football nation, with the national team reaching the final of the 2020 European Championship. This period has also witnessed the emergence of new talent, including the likes of Eduardo Camavinga and Aurélien Tchouaméni, who are set to shape the nation's football future.</a:t>
             </a:r>
           </a:p>
         </p:txBody>
@@ -6490,7 +6420,7 @@
           <a:lstStyle/>
           <a:p>
             <a:r>
-              <a:t>Notable Players</a:t>
+              <a:t>Conclusion</a:t>
             </a:r>
           </a:p>
         </p:txBody>
@@ -6514,243 +6444,7 @@
           <a:p>
             <a:pPr/>
             <a:r>
-              <a:t>Michel Platini is widely regarded as one of the greatest French footballers of all time, winning the Ballon d'Or three times in the 1980s.</a:t>
-            </a:r>
-          </a:p>
-          <a:p>
-            <a:pPr/>
-            <a:r>
-              <a:t>Zinedine Zidane is another iconic player, leading France to World Cup victory in 1998 and winning the FIFA World Player of the Year award in 1998 and 2000.</a:t>
-            </a:r>
-          </a:p>
-          <a:p>
-            <a:pPr/>
-            <a:r>
-              <a:t>Kylian Mbappé is a young and talented player who has already made a significant impact on the French national team, winning the FIFA World Cup in 2018.</a:t>
-            </a:r>
-          </a:p>
-        </p:txBody>
-      </p:sp>
-    </p:spTree>
-  </p:cSld>
-  <p:clrMapOvr>
-    <a:masterClrMapping/>
-  </p:clrMapOvr>
-</p:sld>
-</file>
-
-<file path=ppt/slides/slide9.xml><?xml version="1.0" encoding="utf-8"?>
-<p:sld xmlns:a="http://schemas.openxmlformats.org/drawingml/2006/main" xmlns:p="http://schemas.openxmlformats.org/presentationml/2006/main" xmlns:r="http://schemas.openxmlformats.org/officeDocument/2006/relationships">
-  <p:cSld>
-    <p:spTree>
-      <p:nvGrpSpPr>
-        <p:cNvPr id="1" name=""/>
-        <p:cNvGrpSpPr/>
-        <p:nvPr/>
-      </p:nvGrpSpPr>
-      <p:grpSpPr/>
-      <p:sp>
-        <p:nvSpPr>
-          <p:cNvPr id="2" name="TextBox 1"/>
-          <p:cNvSpPr txBox="1"/>
-          <p:nvPr/>
-        </p:nvSpPr>
-        <p:spPr>
-          <a:xfrm>
-            <a:off x="457200" y="457200"/>
-            <a:ext cx="8229600" cy="914400"/>
-          </a:xfrm>
-          <a:prstGeom prst="rect">
-            <a:avLst/>
-          </a:prstGeom>
-          <a:noFill/>
-        </p:spPr>
-        <p:txBody>
-          <a:bodyPr wrap="none">
-            <a:spAutoFit/>
-          </a:bodyPr>
-          <a:lstStyle/>
-          <a:p>
-            <a:pPr>
-              <a:defRPr sz="3200" b="1"/>
-            </a:pPr>
-            <a:r>
-              <a:t>Tribute to the Past</a:t>
-            </a:r>
-          </a:p>
-        </p:txBody>
-      </p:sp>
-      <p:sp>
-        <p:nvSpPr>
-          <p:cNvPr id="3" name="TextBox 2"/>
-          <p:cNvSpPr txBox="1"/>
-          <p:nvPr/>
-        </p:nvSpPr>
-        <p:spPr>
-          <a:xfrm>
-            <a:off x="457200" y="1371600"/>
-            <a:ext cx="4114800" cy="457200"/>
-          </a:xfrm>
-          <a:prstGeom prst="rect">
-            <a:avLst/>
-          </a:prstGeom>
-          <a:noFill/>
-        </p:spPr>
-        <p:txBody>
-          <a:bodyPr wrap="none">
-            <a:spAutoFit/>
-          </a:bodyPr>
-          <a:lstStyle/>
-          <a:p>
-            <a:pPr algn="ctr">
-              <a:defRPr sz="1800" b="1"/>
-            </a:pPr>
-            <a:r>
-              <a:t>Before / Option A</a:t>
-            </a:r>
-          </a:p>
-        </p:txBody>
-      </p:sp>
-      <p:sp>
-        <p:nvSpPr>
-          <p:cNvPr id="4" name="TextBox 3"/>
-          <p:cNvSpPr txBox="1"/>
-          <p:nvPr/>
-        </p:nvSpPr>
-        <p:spPr>
-          <a:xfrm>
-            <a:off x="5029200" y="1371600"/>
-            <a:ext cx="4114800" cy="457200"/>
-          </a:xfrm>
-          <a:prstGeom prst="rect">
-            <a:avLst/>
-          </a:prstGeom>
-          <a:noFill/>
-        </p:spPr>
-        <p:txBody>
-          <a:bodyPr wrap="none">
-            <a:spAutoFit/>
-          </a:bodyPr>
-          <a:lstStyle/>
-          <a:p>
-            <a:pPr algn="ctr">
-              <a:defRPr sz="1800" b="1"/>
-            </a:pPr>
-            <a:r>
-              <a:t>After / Option B</a:t>
-            </a:r>
-          </a:p>
-        </p:txBody>
-      </p:sp>
-      <p:sp>
-        <p:nvSpPr>
-          <p:cNvPr id="5" name="Rectangle 4"/>
-          <p:cNvSpPr/>
-          <p:nvPr/>
-        </p:nvSpPr>
-        <p:spPr>
-          <a:xfrm>
-            <a:off x="4572000" y="1371600"/>
-            <a:ext cx="0" cy="5029200"/>
-          </a:xfrm>
-          <a:prstGeom prst="rect">
-            <a:avLst/>
-          </a:prstGeom>
-          <a:solidFill>
-            <a:srgbClr val="000000"/>
-          </a:solidFill>
-          <a:ln>
-            <a:noFill/>
-          </a:ln>
-        </p:spPr>
-        <p:style>
-          <a:lnRef idx="1">
-            <a:schemeClr val="accent1"/>
-          </a:lnRef>
-          <a:fillRef idx="3">
-            <a:schemeClr val="accent1"/>
-          </a:fillRef>
-          <a:effectRef idx="2">
-            <a:schemeClr val="accent1"/>
-          </a:effectRef>
-          <a:fontRef idx="minor">
-            <a:schemeClr val="lt1"/>
-          </a:fontRef>
-        </p:style>
-        <p:txBody>
-          <a:bodyPr rtlCol="0" anchor="ctr"/>
-          <a:lstStyle/>
-          <a:p>
-            <a:pPr algn="ctr"/>
-          </a:p>
-        </p:txBody>
-      </p:sp>
-      <p:sp>
-        <p:nvSpPr>
-          <p:cNvPr id="6" name="TextBox 5"/>
-          <p:cNvSpPr txBox="1"/>
-          <p:nvPr/>
-        </p:nvSpPr>
-        <p:spPr>
-          <a:xfrm>
-            <a:off x="457200" y="1828800"/>
-            <a:ext cx="4114800" cy="4572000"/>
-          </a:xfrm>
-          <a:prstGeom prst="rect">
-            <a:avLst/>
-          </a:prstGeom>
-          <a:noFill/>
-        </p:spPr>
-        <p:txBody>
-          <a:bodyPr wrap="square">
-            <a:spAutoFit/>
-          </a:bodyPr>
-          <a:lstStyle/>
-          <a:p>
-            <a:pPr>
-              <a:defRPr sz="1400"/>
-            </a:pPr>
-            <a:r>
-              <a:t>The Stade de France, built for the 1998 FIFA World Cup, has become a symbol of French football, hosting numerous international matches and tournaments.</a:t>
-            </a:r>
-          </a:p>
-          <a:p>
-            <a:pPr>
-              <a:defRPr sz="1400"/>
-            </a:pPr>
-            <a:r>
-              <a:t>The museum provides a unique insight into the evolution of French football, highlighting key milestones, notable players, and significant achievements.</a:t>
-            </a:r>
-          </a:p>
-        </p:txBody>
-      </p:sp>
-      <p:sp>
-        <p:nvSpPr>
-          <p:cNvPr id="7" name="TextBox 6"/>
-          <p:cNvSpPr txBox="1"/>
-          <p:nvPr/>
-        </p:nvSpPr>
-        <p:spPr>
-          <a:xfrm>
-            <a:off x="5029200" y="1828800"/>
-            <a:ext cx="4114800" cy="4572000"/>
-          </a:xfrm>
-          <a:prstGeom prst="rect">
-            <a:avLst/>
-          </a:prstGeom>
-          <a:noFill/>
-        </p:spPr>
-        <p:txBody>
-          <a:bodyPr wrap="square">
-            <a:spAutoFit/>
-          </a:bodyPr>
-          <a:lstStyle/>
-          <a:p>
-            <a:pPr>
-              <a:defRPr sz="1400"/>
-            </a:pPr>
-            <a:r>
-              <a:t>The French national football team's museum, located in the Stade de France, serves as a tribute to the country's football heritage, showcasing memorabilia and artifacts from the team's history.</a:t>
+              <a:t>France's history in football is a rich and fascinating story that spans over a century. From the early years of inconsistent performances to the golden era of the 1950s and 1960s, and from the emergence of Michel Platini to the dominance of Zinedine Zidane, France has produced some of the greatest footballers and teams in the world. Today, France continues to evolve as a football nation, with a new generation of players and coaches shaping the nation's future.</a:t>
             </a:r>
           </a:p>
         </p:txBody>

</xml_diff>